<commit_message>
review Program Synthesis via Counter-Example Guided Inductive Synthesis (CEGIS)
</commit_message>
<xml_diff>
--- a/cegis.pptx
+++ b/cegis.pptx
@@ -3020,7 +3020,7 @@
           <a:p>
             <a:pPr algn="ctr"/>
             <a:r>
-              <a:rPr lang="en-US" sz="2400" dirty="0" smtClean="0">
+              <a:rPr lang="en-US" sz="2300" dirty="0" smtClean="0">
                 <a:solidFill>
                   <a:schemeClr val="tx1"/>
                 </a:solidFill>
@@ -3028,9 +3028,9 @@
                 <a:ea typeface="Verdana" panose="020B0604030504040204" pitchFamily="34" charset="0"/>
                 <a:cs typeface="Verdana" panose="020B0604030504040204" pitchFamily="34" charset="0"/>
               </a:rPr>
-              <a:t>Initialize</a:t>
-            </a:r>
-            <a:endParaRPr lang="en-US" sz="2400" dirty="0">
+              <a:t>Input specification</a:t>
+            </a:r>
+            <a:endParaRPr lang="en-US" sz="2300" dirty="0">
               <a:solidFill>
                 <a:schemeClr val="tx1"/>
               </a:solidFill>
@@ -3229,7 +3229,7 @@
         </p:nvSpPr>
         <p:spPr>
           <a:xfrm>
-            <a:off x="5616321" y="3086100"/>
+            <a:off x="5616321" y="3044536"/>
             <a:ext cx="978408" cy="205740"/>
           </a:xfrm>
           <a:prstGeom prst="rightArrow">
@@ -3277,7 +3277,7 @@
         </p:nvSpPr>
         <p:spPr>
           <a:xfrm rot="10800000">
-            <a:off x="5616321" y="3581400"/>
+            <a:off x="5616321" y="3659231"/>
             <a:ext cx="978408" cy="205740"/>
           </a:xfrm>
           <a:prstGeom prst="rightArrow">
@@ -3421,8 +3421,8 @@
         </p:nvSpPr>
         <p:spPr>
           <a:xfrm>
-            <a:off x="5522595" y="1104586"/>
-            <a:ext cx="3575685" cy="646331"/>
+            <a:off x="2161309" y="2036183"/>
+            <a:ext cx="2916468" cy="923330"/>
           </a:xfrm>
           <a:prstGeom prst="rect">
             <a:avLst/>
@@ -3461,21 +3461,15 @@
               </a:rPr>
               <a:t>of a candidate </a:t>
             </a:r>
-            <a:r>
-              <a:rPr lang="en-US" dirty="0">
-                <a:latin typeface="Verdana" panose="020B0604030504040204" pitchFamily="34" charset="0"/>
-                <a:ea typeface="Verdana" panose="020B0604030504040204" pitchFamily="34" charset="0"/>
-                <a:cs typeface="Verdana" panose="020B0604030504040204" pitchFamily="34" charset="0"/>
-              </a:rPr>
-              <a:t>s</a:t>
-            </a:r>
+          </a:p>
+          <a:p>
             <a:r>
               <a:rPr lang="en-US" dirty="0" smtClean="0">
                 <a:latin typeface="Verdana" panose="020B0604030504040204" pitchFamily="34" charset="0"/>
                 <a:ea typeface="Verdana" panose="020B0604030504040204" pitchFamily="34" charset="0"/>
                 <a:cs typeface="Verdana" panose="020B0604030504040204" pitchFamily="34" charset="0"/>
               </a:rPr>
-              <a:t>olution</a:t>
+              <a:t>solution</a:t>
             </a:r>
             <a:endParaRPr lang="en-US" dirty="0">
               <a:latin typeface="Verdana" panose="020B0604030504040204" pitchFamily="34" charset="0"/>
@@ -3493,7 +3487,7 @@
         </p:nvSpPr>
         <p:spPr>
           <a:xfrm>
-            <a:off x="5465445" y="2359349"/>
+            <a:off x="5423881" y="2286612"/>
             <a:ext cx="1390124" cy="646331"/>
           </a:xfrm>
           <a:prstGeom prst="rect">
@@ -3546,14 +3540,14 @@
         <p:spPr>
           <a:xfrm>
             <a:off x="5492629" y="3864869"/>
-            <a:ext cx="1206741" cy="646331"/>
+            <a:ext cx="1268216" cy="646331"/>
           </a:xfrm>
           <a:prstGeom prst="rect">
             <a:avLst/>
           </a:prstGeom>
         </p:spPr>
         <p:txBody>
-          <a:bodyPr wrap="none">
+          <a:bodyPr wrap="square">
             <a:spAutoFit/>
           </a:bodyPr>
           <a:lstStyle/>
@@ -3689,6 +3683,39 @@
                 <a:srgbClr val="FF0000"/>
               </a:solidFill>
             </a:endParaRPr>
+          </a:p>
+        </p:txBody>
+      </p:sp>
+      <p:sp>
+        <p:nvSpPr>
+          <p:cNvPr id="16" name="Retângulo 15"/>
+          <p:cNvSpPr/>
+          <p:nvPr/>
+        </p:nvSpPr>
+        <p:spPr>
+          <a:xfrm>
+            <a:off x="5572292" y="3269117"/>
+            <a:ext cx="1061766" cy="369332"/>
+          </a:xfrm>
+          <a:prstGeom prst="rect">
+            <a:avLst/>
+          </a:prstGeom>
+        </p:spPr>
+        <p:txBody>
+          <a:bodyPr wrap="none">
+            <a:spAutoFit/>
+          </a:bodyPr>
+          <a:lstStyle/>
+          <a:p>
+            <a:r>
+              <a:rPr lang="en-US" dirty="0" smtClean="0">
+                <a:latin typeface="Verdana" panose="020B0604030504040204" pitchFamily="34" charset="0"/>
+                <a:ea typeface="Verdana" panose="020B0604030504040204" pitchFamily="34" charset="0"/>
+                <a:cs typeface="Verdana" panose="020B0604030504040204" pitchFamily="34" charset="0"/>
+              </a:rPr>
+              <a:t>INPUTS</a:t>
+            </a:r>
+            <a:endParaRPr lang="en-US" dirty="0"/>
           </a:p>
         </p:txBody>
       </p:sp>

</xml_diff>